<commit_message>
Ajuste en mapa conceptual
</commit_message>
<xml_diff>
--- a/fuentes/contenidos/grado07/guion09/MapaConceptual_MA_07_09_CO.pptx
+++ b/fuentes/contenidos/grado07/guion09/MapaConceptual_MA_07_09_CO.pptx
@@ -255,7 +255,7 @@
             <a:fld id="{C764DE79-268F-4C1A-8933-263129D2AF90}" type="datetimeFigureOut">
               <a:rPr lang="en-US" smtClean="0"/>
               <a:pPr/>
-              <a:t>2/22/2016</a:t>
+              <a:t>3/22/2016</a:t>
             </a:fld>
             <a:endParaRPr lang="en-US" dirty="0"/>
           </a:p>
@@ -427,7 +427,7 @@
             <a:fld id="{C764DE79-268F-4C1A-8933-263129D2AF90}" type="datetimeFigureOut">
               <a:rPr lang="en-US" smtClean="0"/>
               <a:pPr/>
-              <a:t>2/22/2016</a:t>
+              <a:t>3/22/2016</a:t>
             </a:fld>
             <a:endParaRPr lang="en-US" dirty="0"/>
           </a:p>
@@ -609,7 +609,7 @@
             <a:fld id="{C764DE79-268F-4C1A-8933-263129D2AF90}" type="datetimeFigureOut">
               <a:rPr lang="en-US" smtClean="0"/>
               <a:pPr/>
-              <a:t>2/22/2016</a:t>
+              <a:t>3/22/2016</a:t>
             </a:fld>
             <a:endParaRPr lang="en-US" dirty="0"/>
           </a:p>
@@ -1077,7 +1077,7 @@
             <a:fld id="{C764DE79-268F-4C1A-8933-263129D2AF90}" type="datetimeFigureOut">
               <a:rPr lang="en-US" smtClean="0"/>
               <a:pPr/>
-              <a:t>2/22/2016</a:t>
+              <a:t>3/22/2016</a:t>
             </a:fld>
             <a:endParaRPr lang="en-US" dirty="0"/>
           </a:p>
@@ -1399,7 +1399,7 @@
             <a:fld id="{C764DE79-268F-4C1A-8933-263129D2AF90}" type="datetimeFigureOut">
               <a:rPr lang="en-US" smtClean="0"/>
               <a:pPr/>
-              <a:t>2/22/2016</a:t>
+              <a:t>3/22/2016</a:t>
             </a:fld>
             <a:endParaRPr lang="en-US" dirty="0"/>
           </a:p>
@@ -1633,7 +1633,7 @@
             <a:fld id="{C764DE79-268F-4C1A-8933-263129D2AF90}" type="datetimeFigureOut">
               <a:rPr lang="en-US" smtClean="0"/>
               <a:pPr/>
-              <a:t>2/22/2016</a:t>
+              <a:t>3/22/2016</a:t>
             </a:fld>
             <a:endParaRPr lang="en-US" dirty="0"/>
           </a:p>
@@ -2002,7 +2002,7 @@
             <a:fld id="{C764DE79-268F-4C1A-8933-263129D2AF90}" type="datetimeFigureOut">
               <a:rPr lang="en-US" smtClean="0"/>
               <a:pPr/>
-              <a:t>2/22/2016</a:t>
+              <a:t>3/22/2016</a:t>
             </a:fld>
             <a:endParaRPr lang="en-US" dirty="0"/>
           </a:p>
@@ -2122,7 +2122,7 @@
             <a:fld id="{C764DE79-268F-4C1A-8933-263129D2AF90}" type="datetimeFigureOut">
               <a:rPr lang="en-US" smtClean="0"/>
               <a:pPr/>
-              <a:t>2/22/2016</a:t>
+              <a:t>3/22/2016</a:t>
             </a:fld>
             <a:endParaRPr lang="en-US" dirty="0"/>
           </a:p>
@@ -2219,7 +2219,7 @@
             <a:fld id="{5001C876-01F7-4317-94B9-1AE222133113}" type="datetimeFigureOut">
               <a:rPr lang="es-ES" smtClean="0"/>
               <a:pPr/>
-              <a:t>22/02/2016</a:t>
+              <a:t>22/03/2016</a:t>
             </a:fld>
             <a:endParaRPr lang="es-ES"/>
           </a:p>
@@ -2498,7 +2498,7 @@
             <a:fld id="{C764DE79-268F-4C1A-8933-263129D2AF90}" type="datetimeFigureOut">
               <a:rPr lang="en-US" smtClean="0"/>
               <a:pPr/>
-              <a:t>2/22/2016</a:t>
+              <a:t>3/22/2016</a:t>
             </a:fld>
             <a:endParaRPr lang="en-US" dirty="0"/>
           </a:p>
@@ -2757,7 +2757,7 @@
             <a:fld id="{C764DE79-268F-4C1A-8933-263129D2AF90}" type="datetimeFigureOut">
               <a:rPr lang="en-US" smtClean="0"/>
               <a:pPr/>
-              <a:t>2/22/2016</a:t>
+              <a:t>3/22/2016</a:t>
             </a:fld>
             <a:endParaRPr lang="en-US" dirty="0"/>
           </a:p>
@@ -2972,7 +2972,7 @@
             <a:fld id="{C764DE79-268F-4C1A-8933-263129D2AF90}" type="datetimeFigureOut">
               <a:rPr lang="en-US" smtClean="0"/>
               <a:pPr/>
-              <a:t>2/22/2016</a:t>
+              <a:t>3/22/2016</a:t>
             </a:fld>
             <a:endParaRPr lang="en-US" dirty="0"/>
           </a:p>
@@ -7419,98 +7419,94 @@
           <a:lstStyle/>
           <a:p>
             <a:r>
-              <a:rPr lang="es-ES_tradnl" sz="900"/>
+              <a:rPr lang="es-ES_tradnl" sz="900" dirty="0" smtClean="0"/>
               <a:t>8</a:t>
             </a:r>
             <a:r>
-              <a:rPr lang="es-ES_tradnl" sz="900" i="1"/>
-              <a:t>a</a:t>
-            </a:r>
-            <a:r>
-              <a:rPr lang="es-ES_tradnl" sz="900" baseline="30000"/>
-              <a:t>4</a:t>
-            </a:r>
-            <a:r>
-              <a:rPr lang="es-ES_tradnl" sz="900" i="1"/>
-              <a:t>x</a:t>
-            </a:r>
-            <a:r>
-              <a:rPr lang="es-ES_tradnl" sz="900"/>
-              <a:t> + (–5</a:t>
-            </a:r>
-            <a:r>
-              <a:rPr lang="es-ES_tradnl" sz="900" i="1"/>
-              <a:t>a</a:t>
-            </a:r>
-            <a:r>
-              <a:rPr lang="es-ES_tradnl" sz="900" baseline="30000"/>
-              <a:t>4</a:t>
-            </a:r>
-            <a:r>
-              <a:rPr lang="es-ES_tradnl" sz="900" i="1"/>
-              <a:t>x</a:t>
-            </a:r>
-            <a:r>
-              <a:rPr lang="es-ES_tradnl" sz="900"/>
-              <a:t>) = 3</a:t>
-            </a:r>
-            <a:r>
-              <a:rPr lang="es-ES_tradnl" sz="900" i="1"/>
-              <a:t>a</a:t>
-            </a:r>
-            <a:r>
-              <a:rPr lang="es-ES_tradnl" sz="900" baseline="30000"/>
-              <a:t>4</a:t>
-            </a:r>
-            <a:r>
-              <a:rPr lang="es-ES_tradnl" sz="900" i="1"/>
-              <a:t>x</a:t>
-            </a:r>
-            <a:endParaRPr lang="es-CO" sz="900" i="1"/>
+              <a:rPr lang="es-ES_tradnl" sz="900" i="1" dirty="0" smtClean="0"/>
+              <a:t>ax</a:t>
+            </a:r>
+            <a:r>
+              <a:rPr lang="es-ES_tradnl" sz="900" dirty="0" smtClean="0"/>
+              <a:t> </a:t>
+            </a:r>
+            <a:r>
+              <a:rPr lang="es-ES_tradnl" sz="900" dirty="0"/>
+              <a:t>+ (–</a:t>
+            </a:r>
+            <a:r>
+              <a:rPr lang="es-ES_tradnl" sz="900" dirty="0" smtClean="0"/>
+              <a:t>5</a:t>
+            </a:r>
+            <a:r>
+              <a:rPr lang="es-ES_tradnl" sz="900" i="1" dirty="0" smtClean="0"/>
+              <a:t>ax</a:t>
+            </a:r>
+            <a:r>
+              <a:rPr lang="es-ES_tradnl" sz="900" dirty="0"/>
+              <a:t>) = </a:t>
+            </a:r>
+            <a:r>
+              <a:rPr lang="es-ES_tradnl" sz="900" dirty="0" smtClean="0"/>
+              <a:t>3</a:t>
+            </a:r>
+            <a:r>
+              <a:rPr lang="es-ES_tradnl" sz="900" i="1" dirty="0" smtClean="0"/>
+              <a:t>ax</a:t>
+            </a:r>
+            <a:endParaRPr lang="es-CO" sz="900" i="1" dirty="0"/>
           </a:p>
           <a:p>
             <a:pPr algn="ctr"/>
             <a:r>
-              <a:rPr lang="es-ES_tradnl" sz="900"/>
-              <a:t>–27</a:t>
-            </a:r>
-            <a:r>
-              <a:rPr lang="es-ES_tradnl" sz="900" i="1"/>
+              <a:rPr lang="es-ES_tradnl" sz="900" dirty="0"/>
+              <a:t>–</a:t>
+            </a:r>
+            <a:r>
+              <a:rPr lang="es-ES_tradnl" sz="900" dirty="0" smtClean="0"/>
+              <a:t>27</a:t>
+            </a:r>
+            <a:r>
+              <a:rPr lang="es-ES_tradnl" sz="900" i="1" dirty="0" smtClean="0"/>
               <a:t>p</a:t>
             </a:r>
             <a:r>
-              <a:rPr lang="es-ES_tradnl" sz="900" baseline="30000"/>
-              <a:t>2</a:t>
-            </a:r>
-            <a:r>
-              <a:rPr lang="es-ES_tradnl" sz="900"/>
-              <a:t> + 19</a:t>
-            </a:r>
-            <a:r>
-              <a:rPr lang="es-ES_tradnl" sz="900" i="1"/>
+              <a:rPr lang="es-ES_tradnl" sz="900" dirty="0" smtClean="0"/>
+              <a:t> </a:t>
+            </a:r>
+            <a:r>
+              <a:rPr lang="es-ES_tradnl" sz="900" dirty="0"/>
+              <a:t>+ </a:t>
+            </a:r>
+            <a:r>
+              <a:rPr lang="es-ES_tradnl" sz="900" dirty="0" smtClean="0"/>
+              <a:t>19</a:t>
+            </a:r>
+            <a:r>
+              <a:rPr lang="es-ES_tradnl" sz="900" i="1" dirty="0" smtClean="0"/>
               <a:t>p</a:t>
             </a:r>
             <a:r>
-              <a:rPr lang="es-ES_tradnl" sz="900" baseline="30000"/>
-              <a:t>2</a:t>
-            </a:r>
-            <a:r>
-              <a:rPr lang="es-ES_tradnl" sz="900"/>
-              <a:t> = –8</a:t>
-            </a:r>
-            <a:r>
-              <a:rPr lang="es-ES_tradnl" sz="900" i="1"/>
+              <a:rPr lang="es-ES_tradnl" sz="900" dirty="0" smtClean="0"/>
+              <a:t> </a:t>
+            </a:r>
+            <a:r>
+              <a:rPr lang="es-ES_tradnl" sz="900" dirty="0"/>
+              <a:t>= –</a:t>
+            </a:r>
+            <a:r>
+              <a:rPr lang="es-ES_tradnl" sz="900" dirty="0" smtClean="0"/>
+              <a:t>8</a:t>
+            </a:r>
+            <a:r>
+              <a:rPr lang="es-ES_tradnl" sz="900" i="1" dirty="0" smtClean="0"/>
               <a:t>p</a:t>
             </a:r>
             <a:r>
-              <a:rPr lang="es-ES_tradnl" sz="900" baseline="30000"/>
-              <a:t>2</a:t>
-            </a:r>
-            <a:r>
-              <a:rPr lang="es-ES_tradnl" sz="900"/>
+              <a:rPr lang="es-ES_tradnl" sz="900" dirty="0" smtClean="0"/>
               <a:t>   </a:t>
             </a:r>
-            <a:endParaRPr lang="es-CO" sz="900"/>
+            <a:endParaRPr lang="es-CO" sz="900" dirty="0"/>
           </a:p>
         </p:txBody>
       </p:sp>

</xml_diff>